<commit_message>
Docs: Update the info
</commit_message>
<xml_diff>
--- a/slides/Introduction to Python Programming for Beginners.pptx
+++ b/slides/Introduction to Python Programming for Beginners.pptx
@@ -6829,15 +6829,78 @@
           <a:lstStyle/>
           <a:p>
             <a:r>
-              <a:rPr lang="en-US"/>
-              <a:t>Installing Python on Windows, macOS, Linux</a:t>
-            </a:r>
-          </a:p>
-          <a:p>
-            <a:r>
-              <a:rPr lang="en-US"/>
-              <a:t>Introduction to IDLE</a:t>
-            </a:r>
+              <a:rPr lang="en-US" dirty="0"/>
+              <a:t>Installing </a:t>
+            </a:r>
+            <a:r>
+              <a:rPr lang="en-US" b="1" dirty="0">
+                <a:solidFill>
+                  <a:srgbClr val="404040"/>
+                </a:solidFill>
+                <a:latin typeface="Proxima Nova"/>
+              </a:rPr>
+              <a:t>Python</a:t>
+            </a:r>
+            <a:r>
+              <a:rPr lang="en-US" dirty="0"/>
+              <a:t> on Windows, macOS, Linux</a:t>
+            </a:r>
+            <a:endParaRPr lang="fa-IR" dirty="0"/>
+          </a:p>
+          <a:p>
+            <a:r>
+              <a:rPr lang="en-US" dirty="0"/>
+              <a:t>Installing and setting up </a:t>
+            </a:r>
+            <a:r>
+              <a:rPr lang="en-US" b="1" i="0" dirty="0" err="1">
+                <a:solidFill>
+                  <a:srgbClr val="404040"/>
+                </a:solidFill>
+                <a:effectLst/>
+                <a:latin typeface="Proxima Nova"/>
+              </a:rPr>
+              <a:t>Miniconda</a:t>
+            </a:r>
+            <a:r>
+              <a:rPr lang="en-US" dirty="0"/>
+              <a:t> </a:t>
+            </a:r>
+          </a:p>
+          <a:p>
+            <a:r>
+              <a:rPr lang="en-US" dirty="0"/>
+              <a:t>Introduction to </a:t>
+            </a:r>
+            <a:r>
+              <a:rPr lang="en-US" b="1" dirty="0">
+                <a:solidFill>
+                  <a:srgbClr val="404040"/>
+                </a:solidFill>
+                <a:latin typeface="Proxima Nova"/>
+              </a:rPr>
+              <a:t>VS Code </a:t>
+            </a:r>
+            <a:r>
+              <a:rPr lang="en-US" dirty="0"/>
+              <a:t>as IDE</a:t>
+            </a:r>
+          </a:p>
+          <a:p>
+            <a:r>
+              <a:rPr lang="en-US" b="1" dirty="0" err="1">
+                <a:solidFill>
+                  <a:srgbClr val="404040"/>
+                </a:solidFill>
+                <a:latin typeface="Proxima Nova"/>
+              </a:rPr>
+              <a:t>Jupyter</a:t>
+            </a:r>
+            <a:r>
+              <a:rPr lang="en-US"/>
+              <a:t> notebooks</a:t>
+            </a:r>
+            <a:endParaRPr lang="en-US" dirty="0"/>
           </a:p>
         </p:txBody>
       </p:sp>

</xml_diff>

<commit_message>
Add: New course material.
</commit_message>
<xml_diff>
--- a/slides/Introduction to Python Programming for Beginners.pptx
+++ b/slides/Introduction to Python Programming for Beginners.pptx
@@ -310,7 +310,7 @@
           <a:p>
             <a:fld id="{9D769277-3A16-4225-B66B-FECFDAA5C942}" type="datetimeFigureOut">
               <a:rPr lang="en-US" smtClean="0"/>
-              <a:t>8/23/2023</a:t>
+              <a:t>8/26/2023</a:t>
             </a:fld>
             <a:endParaRPr lang="en-US"/>
           </a:p>
@@ -585,7 +585,7 @@
           <a:p>
             <a:fld id="{9D769277-3A16-4225-B66B-FECFDAA5C942}" type="datetimeFigureOut">
               <a:rPr lang="en-US" smtClean="0"/>
-              <a:t>8/23/2023</a:t>
+              <a:t>8/26/2023</a:t>
             </a:fld>
             <a:endParaRPr lang="en-US"/>
           </a:p>
@@ -779,7 +779,7 @@
           <a:p>
             <a:fld id="{9D769277-3A16-4225-B66B-FECFDAA5C942}" type="datetimeFigureOut">
               <a:rPr lang="en-US" smtClean="0"/>
-              <a:t>8/23/2023</a:t>
+              <a:t>8/26/2023</a:t>
             </a:fld>
             <a:endParaRPr lang="en-US"/>
           </a:p>
@@ -1052,7 +1052,7 @@
           <a:p>
             <a:fld id="{9D769277-3A16-4225-B66B-FECFDAA5C942}" type="datetimeFigureOut">
               <a:rPr lang="en-US" smtClean="0"/>
-              <a:t>8/23/2023</a:t>
+              <a:t>8/26/2023</a:t>
             </a:fld>
             <a:endParaRPr lang="en-US"/>
           </a:p>
@@ -1393,7 +1393,7 @@
           <a:p>
             <a:fld id="{9D769277-3A16-4225-B66B-FECFDAA5C942}" type="datetimeFigureOut">
               <a:rPr lang="en-US" smtClean="0"/>
-              <a:t>8/23/2023</a:t>
+              <a:t>8/26/2023</a:t>
             </a:fld>
             <a:endParaRPr lang="en-US"/>
           </a:p>
@@ -2016,7 +2016,7 @@
           <a:p>
             <a:fld id="{9D769277-3A16-4225-B66B-FECFDAA5C942}" type="datetimeFigureOut">
               <a:rPr lang="en-US" smtClean="0"/>
-              <a:t>8/23/2023</a:t>
+              <a:t>8/26/2023</a:t>
             </a:fld>
             <a:endParaRPr lang="en-US"/>
           </a:p>
@@ -2876,7 +2876,7 @@
           <a:p>
             <a:fld id="{9D769277-3A16-4225-B66B-FECFDAA5C942}" type="datetimeFigureOut">
               <a:rPr lang="en-US" smtClean="0"/>
-              <a:t>8/23/2023</a:t>
+              <a:t>8/26/2023</a:t>
             </a:fld>
             <a:endParaRPr lang="en-US"/>
           </a:p>
@@ -3046,7 +3046,7 @@
           <a:p>
             <a:fld id="{9D769277-3A16-4225-B66B-FECFDAA5C942}" type="datetimeFigureOut">
               <a:rPr lang="en-US" smtClean="0"/>
-              <a:t>8/23/2023</a:t>
+              <a:t>8/26/2023</a:t>
             </a:fld>
             <a:endParaRPr lang="en-US"/>
           </a:p>
@@ -3226,7 +3226,7 @@
           <a:p>
             <a:fld id="{9D769277-3A16-4225-B66B-FECFDAA5C942}" type="datetimeFigureOut">
               <a:rPr lang="en-US" smtClean="0"/>
-              <a:t>8/23/2023</a:t>
+              <a:t>8/26/2023</a:t>
             </a:fld>
             <a:endParaRPr lang="en-US"/>
           </a:p>
@@ -3412,7 +3412,7 @@
           <a:p>
             <a:fld id="{9D769277-3A16-4225-B66B-FECFDAA5C942}" type="datetimeFigureOut">
               <a:rPr lang="en-US" smtClean="0"/>
-              <a:t>8/23/2023</a:t>
+              <a:t>8/26/2023</a:t>
             </a:fld>
             <a:endParaRPr lang="en-US"/>
           </a:p>
@@ -3594,7 +3594,7 @@
           <a:p>
             <a:fld id="{9D769277-3A16-4225-B66B-FECFDAA5C942}" type="datetimeFigureOut">
               <a:rPr lang="en-US" smtClean="0"/>
-              <a:t>8/23/2023</a:t>
+              <a:t>8/26/2023</a:t>
             </a:fld>
             <a:endParaRPr lang="en-US"/>
           </a:p>
@@ -3841,7 +3841,7 @@
           <a:p>
             <a:fld id="{9D769277-3A16-4225-B66B-FECFDAA5C942}" type="datetimeFigureOut">
               <a:rPr lang="en-US" smtClean="0"/>
-              <a:t>8/23/2023</a:t>
+              <a:t>8/26/2023</a:t>
             </a:fld>
             <a:endParaRPr lang="en-US"/>
           </a:p>
@@ -4133,7 +4133,7 @@
           <a:p>
             <a:fld id="{9D769277-3A16-4225-B66B-FECFDAA5C942}" type="datetimeFigureOut">
               <a:rPr lang="en-US" smtClean="0"/>
-              <a:t>8/23/2023</a:t>
+              <a:t>8/26/2023</a:t>
             </a:fld>
             <a:endParaRPr lang="en-US"/>
           </a:p>
@@ -4577,7 +4577,7 @@
           <a:p>
             <a:fld id="{9D769277-3A16-4225-B66B-FECFDAA5C942}" type="datetimeFigureOut">
               <a:rPr lang="en-US" smtClean="0"/>
-              <a:t>8/23/2023</a:t>
+              <a:t>8/26/2023</a:t>
             </a:fld>
             <a:endParaRPr lang="en-US"/>
           </a:p>
@@ -4695,7 +4695,7 @@
           <a:p>
             <a:fld id="{9D769277-3A16-4225-B66B-FECFDAA5C942}" type="datetimeFigureOut">
               <a:rPr lang="en-US" smtClean="0"/>
-              <a:t>8/23/2023</a:t>
+              <a:t>8/26/2023</a:t>
             </a:fld>
             <a:endParaRPr lang="en-US"/>
           </a:p>
@@ -4790,7 +4790,7 @@
           <a:p>
             <a:fld id="{9D769277-3A16-4225-B66B-FECFDAA5C942}" type="datetimeFigureOut">
               <a:rPr lang="en-US" smtClean="0"/>
-              <a:t>8/23/2023</a:t>
+              <a:t>8/26/2023</a:t>
             </a:fld>
             <a:endParaRPr lang="en-US"/>
           </a:p>
@@ -5069,7 +5069,7 @@
           <a:p>
             <a:fld id="{9D769277-3A16-4225-B66B-FECFDAA5C942}" type="datetimeFigureOut">
               <a:rPr lang="en-US" smtClean="0"/>
-              <a:t>8/23/2023</a:t>
+              <a:t>8/26/2023</a:t>
             </a:fld>
             <a:endParaRPr lang="en-US"/>
           </a:p>
@@ -5344,7 +5344,7 @@
           <a:p>
             <a:fld id="{9D769277-3A16-4225-B66B-FECFDAA5C942}" type="datetimeFigureOut">
               <a:rPr lang="en-US" smtClean="0"/>
-              <a:t>8/23/2023</a:t>
+              <a:t>8/26/2023</a:t>
             </a:fld>
             <a:endParaRPr lang="en-US"/>
           </a:p>
@@ -5773,7 +5773,7 @@
           <a:p>
             <a:fld id="{9D769277-3A16-4225-B66B-FECFDAA5C942}" type="datetimeFigureOut">
               <a:rPr lang="en-US" smtClean="0"/>
-              <a:t>8/23/2023</a:t>
+              <a:t>8/26/2023</a:t>
             </a:fld>
             <a:endParaRPr lang="en-US"/>
           </a:p>
@@ -6897,9 +6897,35 @@
               <a:t>Jupyter</a:t>
             </a:r>
             <a:r>
-              <a:rPr lang="en-US"/>
+              <a:rPr lang="en-US" dirty="0"/>
               <a:t> notebooks</a:t>
             </a:r>
+          </a:p>
+          <a:p>
+            <a:endParaRPr lang="en-US" dirty="0"/>
+          </a:p>
+          <a:p>
+            <a:r>
+              <a:rPr lang="en-US" dirty="0"/>
+              <a:t>Check the materials for week 1 in the following link:</a:t>
+            </a:r>
+          </a:p>
+          <a:p>
+            <a:pPr marL="0" indent="0">
+              <a:buNone/>
+            </a:pPr>
+            <a:r>
+              <a:rPr lang="en-US" dirty="0">
+                <a:hlinkClick r:id="rId2"/>
+              </a:rPr>
+              <a:t>https://github.com/AliAkbarAhmadiDaryab/Introduction-to-Data-Science-with-Python/blob/main/slides/week1/README.md</a:t>
+            </a:r>
+            <a:endParaRPr lang="en-US" dirty="0"/>
+          </a:p>
+          <a:p>
+            <a:pPr marL="0" indent="0">
+              <a:buNone/>
+            </a:pPr>
             <a:endParaRPr lang="en-US" dirty="0"/>
           </a:p>
         </p:txBody>
@@ -6984,15 +7010,20 @@
           <a:lstStyle/>
           <a:p>
             <a:r>
-              <a:rPr lang="en-US"/>
+              <a:rPr lang="en-US" dirty="0"/>
               <a:t>Show code: print("Hello, World!")</a:t>
             </a:r>
           </a:p>
           <a:p>
             <a:r>
-              <a:rPr lang="en-US"/>
-              <a:t>Run the program in IDLE</a:t>
-            </a:r>
+              <a:rPr lang="en-US" dirty="0"/>
+              <a:t>Run the program in IDE (Integrated </a:t>
+            </a:r>
+            <a:r>
+              <a:rPr lang="en-US"/>
+              <a:t>Development Environment)</a:t>
+            </a:r>
+            <a:endParaRPr lang="en-US" dirty="0"/>
           </a:p>
         </p:txBody>
       </p:sp>

</xml_diff>